<commit_message>
Read INGW64 ~/github/StudyNotes (master)
</commit_message>
<xml_diff>
--- a/03DE-E-Detector.pptx
+++ b/03DE-E-Detector.pptx
@@ -6,13 +6,18 @@
   </p:sldMasterIdLst>
   <p:sldIdLst>
     <p:sldId id="256" r:id="rId2"/>
-    <p:sldId id="257" r:id="rId3"/>
-    <p:sldId id="258" r:id="rId4"/>
-    <p:sldId id="259" r:id="rId5"/>
-    <p:sldId id="260" r:id="rId6"/>
-    <p:sldId id="261" r:id="rId7"/>
-    <p:sldId id="262" r:id="rId8"/>
-    <p:sldId id="263" r:id="rId9"/>
+    <p:sldId id="265" r:id="rId3"/>
+    <p:sldId id="257" r:id="rId4"/>
+    <p:sldId id="266" r:id="rId5"/>
+    <p:sldId id="267" r:id="rId6"/>
+    <p:sldId id="268" r:id="rId7"/>
+    <p:sldId id="269" r:id="rId8"/>
+    <p:sldId id="258" r:id="rId9"/>
+    <p:sldId id="259" r:id="rId10"/>
+    <p:sldId id="260" r:id="rId11"/>
+    <p:sldId id="261" r:id="rId12"/>
+    <p:sldId id="262" r:id="rId13"/>
+    <p:sldId id="263" r:id="rId14"/>
   </p:sldIdLst>
   <p:sldSz cx="12192000" cy="6858000"/>
   <p:notesSz cx="6858000" cy="9144000"/>
@@ -250,7 +255,7 @@
           <a:p>
             <a:fld id="{B49F1F9E-BB21-4ADB-B707-20B3786FE04D}" type="datetimeFigureOut">
               <a:rPr lang="en-US" smtClean="0"/>
-              <a:t>10/24/2018</a:t>
+              <a:t>10/28/2018</a:t>
             </a:fld>
             <a:endParaRPr lang="en-US"/>
           </a:p>
@@ -420,7 +425,7 @@
           <a:p>
             <a:fld id="{B49F1F9E-BB21-4ADB-B707-20B3786FE04D}" type="datetimeFigureOut">
               <a:rPr lang="en-US" smtClean="0"/>
-              <a:t>10/24/2018</a:t>
+              <a:t>10/28/2018</a:t>
             </a:fld>
             <a:endParaRPr lang="en-US"/>
           </a:p>
@@ -600,7 +605,7 @@
           <a:p>
             <a:fld id="{B49F1F9E-BB21-4ADB-B707-20B3786FE04D}" type="datetimeFigureOut">
               <a:rPr lang="en-US" smtClean="0"/>
-              <a:t>10/24/2018</a:t>
+              <a:t>10/28/2018</a:t>
             </a:fld>
             <a:endParaRPr lang="en-US"/>
           </a:p>
@@ -770,7 +775,7 @@
           <a:p>
             <a:fld id="{B49F1F9E-BB21-4ADB-B707-20B3786FE04D}" type="datetimeFigureOut">
               <a:rPr lang="en-US" smtClean="0"/>
-              <a:t>10/24/2018</a:t>
+              <a:t>10/28/2018</a:t>
             </a:fld>
             <a:endParaRPr lang="en-US"/>
           </a:p>
@@ -1016,7 +1021,7 @@
           <a:p>
             <a:fld id="{B49F1F9E-BB21-4ADB-B707-20B3786FE04D}" type="datetimeFigureOut">
               <a:rPr lang="en-US" smtClean="0"/>
-              <a:t>10/24/2018</a:t>
+              <a:t>10/28/2018</a:t>
             </a:fld>
             <a:endParaRPr lang="en-US"/>
           </a:p>
@@ -1248,7 +1253,7 @@
           <a:p>
             <a:fld id="{B49F1F9E-BB21-4ADB-B707-20B3786FE04D}" type="datetimeFigureOut">
               <a:rPr lang="en-US" smtClean="0"/>
-              <a:t>10/24/2018</a:t>
+              <a:t>10/28/2018</a:t>
             </a:fld>
             <a:endParaRPr lang="en-US"/>
           </a:p>
@@ -1615,7 +1620,7 @@
           <a:p>
             <a:fld id="{B49F1F9E-BB21-4ADB-B707-20B3786FE04D}" type="datetimeFigureOut">
               <a:rPr lang="en-US" smtClean="0"/>
-              <a:t>10/24/2018</a:t>
+              <a:t>10/28/2018</a:t>
             </a:fld>
             <a:endParaRPr lang="en-US"/>
           </a:p>
@@ -1733,7 +1738,7 @@
           <a:p>
             <a:fld id="{B49F1F9E-BB21-4ADB-B707-20B3786FE04D}" type="datetimeFigureOut">
               <a:rPr lang="en-US" smtClean="0"/>
-              <a:t>10/24/2018</a:t>
+              <a:t>10/28/2018</a:t>
             </a:fld>
             <a:endParaRPr lang="en-US"/>
           </a:p>
@@ -1828,7 +1833,7 @@
           <a:p>
             <a:fld id="{B49F1F9E-BB21-4ADB-B707-20B3786FE04D}" type="datetimeFigureOut">
               <a:rPr lang="en-US" smtClean="0"/>
-              <a:t>10/24/2018</a:t>
+              <a:t>10/28/2018</a:t>
             </a:fld>
             <a:endParaRPr lang="en-US"/>
           </a:p>
@@ -2105,7 +2110,7 @@
           <a:p>
             <a:fld id="{B49F1F9E-BB21-4ADB-B707-20B3786FE04D}" type="datetimeFigureOut">
               <a:rPr lang="en-US" smtClean="0"/>
-              <a:t>10/24/2018</a:t>
+              <a:t>10/28/2018</a:t>
             </a:fld>
             <a:endParaRPr lang="en-US"/>
           </a:p>
@@ -2358,7 +2363,7 @@
           <a:p>
             <a:fld id="{B49F1F9E-BB21-4ADB-B707-20B3786FE04D}" type="datetimeFigureOut">
               <a:rPr lang="en-US" smtClean="0"/>
-              <a:t>10/24/2018</a:t>
+              <a:t>10/28/2018</a:t>
             </a:fld>
             <a:endParaRPr lang="en-US"/>
           </a:p>
@@ -2571,7 +2576,7 @@
           <a:p>
             <a:fld id="{B49F1F9E-BB21-4ADB-B707-20B3786FE04D}" type="datetimeFigureOut">
               <a:rPr lang="en-US" smtClean="0"/>
-              <a:t>10/24/2018</a:t>
+              <a:t>10/28/2018</a:t>
             </a:fld>
             <a:endParaRPr lang="en-US"/>
           </a:p>
@@ -3081,7 +3086,24 @@
                 <a:latin typeface="Times New Roman" panose="02020603050405020304" pitchFamily="18" charset="0"/>
                 <a:cs typeface="Times New Roman" panose="02020603050405020304" pitchFamily="18" charset="0"/>
               </a:rPr>
-              <a:t>● Th228, characterized by eight well-known alpha energies, and alpha peak are separated by at least 0.1MeV </a:t>
+              <a:t>● Th228, characterized by </a:t>
+            </a:r>
+            <a:r>
+              <a:rPr lang="en-US" b="1" dirty="0" smtClean="0">
+                <a:solidFill>
+                  <a:srgbClr val="FF0000"/>
+                </a:solidFill>
+                <a:latin typeface="Times New Roman" panose="02020603050405020304" pitchFamily="18" charset="0"/>
+                <a:cs typeface="Times New Roman" panose="02020603050405020304" pitchFamily="18" charset="0"/>
+              </a:rPr>
+              <a:t>eight well-known alpha energies</a:t>
+            </a:r>
+            <a:r>
+              <a:rPr lang="en-US" dirty="0" smtClean="0">
+                <a:latin typeface="Times New Roman" panose="02020603050405020304" pitchFamily="18" charset="0"/>
+                <a:cs typeface="Times New Roman" panose="02020603050405020304" pitchFamily="18" charset="0"/>
+              </a:rPr>
+              <a:t>, and alpha peak are separated by at least 0.1MeV </a:t>
             </a:r>
             <a:endParaRPr lang="en-US" dirty="0">
               <a:latin typeface="Times New Roman" panose="02020603050405020304" pitchFamily="18" charset="0"/>
@@ -3226,6 +3248,126 @@
     <p:extLst>
       <p:ext uri="{BB962C8B-B14F-4D97-AF65-F5344CB8AC3E}">
         <p14:creationId xmlns:p14="http://schemas.microsoft.com/office/powerpoint/2010/main" val="39117988"/>
+      </p:ext>
+    </p:extLst>
+  </p:cSld>
+  <p:clrMapOvr>
+    <a:masterClrMapping/>
+  </p:clrMapOvr>
+</p:sld>
+</file>
+
+<file path=ppt/slides/slide10.xml><?xml version="1.0" encoding="utf-8"?>
+<p:sld xmlns:a="http://schemas.openxmlformats.org/drawingml/2006/main" xmlns:r="http://schemas.openxmlformats.org/officeDocument/2006/relationships" xmlns:p="http://schemas.openxmlformats.org/presentationml/2006/main">
+  <p:cSld>
+    <p:spTree>
+      <p:nvGrpSpPr>
+        <p:cNvPr id="1" name=""/>
+        <p:cNvGrpSpPr/>
+        <p:nvPr/>
+      </p:nvGrpSpPr>
+      <p:grpSpPr>
+        <a:xfrm>
+          <a:off x="0" y="0"/>
+          <a:ext cx="0" cy="0"/>
+          <a:chOff x="0" y="0"/>
+          <a:chExt cx="0" cy="0"/>
+        </a:xfrm>
+      </p:grpSpPr>
+    </p:spTree>
+    <p:extLst>
+      <p:ext uri="{BB962C8B-B14F-4D97-AF65-F5344CB8AC3E}">
+        <p14:creationId xmlns:p14="http://schemas.microsoft.com/office/powerpoint/2010/main" val="3578612920"/>
+      </p:ext>
+    </p:extLst>
+  </p:cSld>
+  <p:clrMapOvr>
+    <a:masterClrMapping/>
+  </p:clrMapOvr>
+</p:sld>
+</file>
+
+<file path=ppt/slides/slide11.xml><?xml version="1.0" encoding="utf-8"?>
+<p:sld xmlns:a="http://schemas.openxmlformats.org/drawingml/2006/main" xmlns:r="http://schemas.openxmlformats.org/officeDocument/2006/relationships" xmlns:p="http://schemas.openxmlformats.org/presentationml/2006/main">
+  <p:cSld>
+    <p:spTree>
+      <p:nvGrpSpPr>
+        <p:cNvPr id="1" name=""/>
+        <p:cNvGrpSpPr/>
+        <p:nvPr/>
+      </p:nvGrpSpPr>
+      <p:grpSpPr>
+        <a:xfrm>
+          <a:off x="0" y="0"/>
+          <a:ext cx="0" cy="0"/>
+          <a:chOff x="0" y="0"/>
+          <a:chExt cx="0" cy="0"/>
+        </a:xfrm>
+      </p:grpSpPr>
+    </p:spTree>
+    <p:extLst>
+      <p:ext uri="{BB962C8B-B14F-4D97-AF65-F5344CB8AC3E}">
+        <p14:creationId xmlns:p14="http://schemas.microsoft.com/office/powerpoint/2010/main" val="1885448950"/>
+      </p:ext>
+    </p:extLst>
+  </p:cSld>
+  <p:clrMapOvr>
+    <a:masterClrMapping/>
+  </p:clrMapOvr>
+</p:sld>
+</file>
+
+<file path=ppt/slides/slide12.xml><?xml version="1.0" encoding="utf-8"?>
+<p:sld xmlns:a="http://schemas.openxmlformats.org/drawingml/2006/main" xmlns:r="http://schemas.openxmlformats.org/officeDocument/2006/relationships" xmlns:p="http://schemas.openxmlformats.org/presentationml/2006/main">
+  <p:cSld>
+    <p:spTree>
+      <p:nvGrpSpPr>
+        <p:cNvPr id="1" name=""/>
+        <p:cNvGrpSpPr/>
+        <p:nvPr/>
+      </p:nvGrpSpPr>
+      <p:grpSpPr>
+        <a:xfrm>
+          <a:off x="0" y="0"/>
+          <a:ext cx="0" cy="0"/>
+          <a:chOff x="0" y="0"/>
+          <a:chExt cx="0" cy="0"/>
+        </a:xfrm>
+      </p:grpSpPr>
+    </p:spTree>
+    <p:extLst>
+      <p:ext uri="{BB962C8B-B14F-4D97-AF65-F5344CB8AC3E}">
+        <p14:creationId xmlns:p14="http://schemas.microsoft.com/office/powerpoint/2010/main" val="2761243511"/>
+      </p:ext>
+    </p:extLst>
+  </p:cSld>
+  <p:clrMapOvr>
+    <a:masterClrMapping/>
+  </p:clrMapOvr>
+</p:sld>
+</file>
+
+<file path=ppt/slides/slide13.xml><?xml version="1.0" encoding="utf-8"?>
+<p:sld xmlns:a="http://schemas.openxmlformats.org/drawingml/2006/main" xmlns:r="http://schemas.openxmlformats.org/officeDocument/2006/relationships" xmlns:p="http://schemas.openxmlformats.org/presentationml/2006/main">
+  <p:cSld>
+    <p:spTree>
+      <p:nvGrpSpPr>
+        <p:cNvPr id="1" name=""/>
+        <p:cNvGrpSpPr/>
+        <p:nvPr/>
+      </p:nvGrpSpPr>
+      <p:grpSpPr>
+        <a:xfrm>
+          <a:off x="0" y="0"/>
+          <a:ext cx="0" cy="0"/>
+          <a:chOff x="0" y="0"/>
+          <a:chExt cx="0" cy="0"/>
+        </a:xfrm>
+      </p:grpSpPr>
+    </p:spTree>
+    <p:extLst>
+      <p:ext uri="{BB962C8B-B14F-4D97-AF65-F5344CB8AC3E}">
+        <p14:creationId xmlns:p14="http://schemas.microsoft.com/office/powerpoint/2010/main" val="1392733591"/>
       </p:ext>
     </p:extLst>
   </p:cSld>
@@ -3280,21 +3422,8 @@
                   <a:srgbClr val="FF0000"/>
                 </a:solidFill>
               </a:rPr>
-              <a:t>Date: </a:t>
-            </a:r>
-            <a:r>
-              <a:rPr lang="en-US" sz="1600" dirty="0" smtClean="0">
-                <a:solidFill>
-                  <a:srgbClr val="FF0000"/>
-                </a:solidFill>
-              </a:rPr>
-              <a:t>2018-10-24</a:t>
-            </a:r>
-            <a:endParaRPr lang="en-US" sz="1600" dirty="0" smtClean="0">
-              <a:solidFill>
-                <a:srgbClr val="FF0000"/>
-              </a:solidFill>
-            </a:endParaRPr>
+              <a:t>Date: 2018-10-24</a:t>
+            </a:r>
           </a:p>
           <a:p>
             <a:r>
@@ -3349,6 +3478,361 @@
             <a:endParaRPr lang="en-US" b="1" i="0" dirty="0">
               <a:effectLst/>
               <a:latin typeface="Arial" panose="020B0604020202020204" pitchFamily="34" charset="0"/>
+            </a:endParaRPr>
+          </a:p>
+        </p:txBody>
+      </p:sp>
+      <p:sp>
+        <p:nvSpPr>
+          <p:cNvPr id="4" name="文本框 3"/>
+          <p:cNvSpPr txBox="1"/>
+          <p:nvPr/>
+        </p:nvSpPr>
+        <p:spPr>
+          <a:xfrm>
+            <a:off x="813429" y="1675237"/>
+            <a:ext cx="4753182" cy="369332"/>
+          </a:xfrm>
+          <a:prstGeom prst="rect">
+            <a:avLst/>
+          </a:prstGeom>
+          <a:noFill/>
+        </p:spPr>
+        <p:txBody>
+          <a:bodyPr wrap="square" rtlCol="0">
+            <a:spAutoFit/>
+          </a:bodyPr>
+          <a:lstStyle/>
+          <a:p>
+            <a:r>
+              <a:rPr lang="en-US" altLang="zh-CN" dirty="0" smtClean="0"/>
+              <a:t>Q1: </a:t>
+            </a:r>
+            <a:r>
+              <a:rPr lang="zh-CN" altLang="en-US" dirty="0" smtClean="0"/>
+              <a:t>放射源发射粒子是各向同性的吗</a:t>
+            </a:r>
+            <a:r>
+              <a:rPr lang="zh-CN" altLang="en-US" dirty="0"/>
+              <a:t>？</a:t>
+            </a:r>
+          </a:p>
+        </p:txBody>
+      </p:sp>
+    </p:spTree>
+    <p:extLst>
+      <p:ext uri="{BB962C8B-B14F-4D97-AF65-F5344CB8AC3E}">
+        <p14:creationId xmlns:p14="http://schemas.microsoft.com/office/powerpoint/2010/main" val="2643122334"/>
+      </p:ext>
+    </p:extLst>
+  </p:cSld>
+  <p:clrMapOvr>
+    <a:masterClrMapping/>
+  </p:clrMapOvr>
+</p:sld>
+</file>
+
+<file path=ppt/slides/slide3.xml><?xml version="1.0" encoding="utf-8"?>
+<p:sld xmlns:a="http://schemas.openxmlformats.org/drawingml/2006/main" xmlns:r="http://schemas.openxmlformats.org/officeDocument/2006/relationships" xmlns:p="http://schemas.openxmlformats.org/presentationml/2006/main">
+  <p:cSld>
+    <p:spTree>
+      <p:nvGrpSpPr>
+        <p:cNvPr id="1" name=""/>
+        <p:cNvGrpSpPr/>
+        <p:nvPr/>
+      </p:nvGrpSpPr>
+      <p:grpSpPr>
+        <a:xfrm>
+          <a:off x="0" y="0"/>
+          <a:ext cx="0" cy="0"/>
+          <a:chOff x="0" y="0"/>
+          <a:chExt cx="0" cy="0"/>
+        </a:xfrm>
+      </p:grpSpPr>
+      <p:sp>
+        <p:nvSpPr>
+          <p:cNvPr id="2" name="TextBox 1"/>
+          <p:cNvSpPr txBox="1"/>
+          <p:nvPr/>
+        </p:nvSpPr>
+        <p:spPr>
+          <a:xfrm>
+            <a:off x="0" y="0"/>
+            <a:ext cx="7010400" cy="584775"/>
+          </a:xfrm>
+          <a:prstGeom prst="rect">
+            <a:avLst/>
+          </a:prstGeom>
+          <a:noFill/>
+        </p:spPr>
+        <p:txBody>
+          <a:bodyPr wrap="square" rtlCol="0">
+            <a:spAutoFit/>
+          </a:bodyPr>
+          <a:lstStyle/>
+          <a:p>
+            <a:r>
+              <a:rPr lang="en-US" sz="1600" dirty="0" smtClean="0">
+                <a:solidFill>
+                  <a:srgbClr val="FF0000"/>
+                </a:solidFill>
+              </a:rPr>
+              <a:t>Date</a:t>
+            </a:r>
+            <a:r>
+              <a:rPr lang="en-US" sz="1600" dirty="0" smtClean="0">
+                <a:solidFill>
+                  <a:srgbClr val="FF0000"/>
+                </a:solidFill>
+              </a:rPr>
+              <a:t>: 2018</a:t>
+            </a:r>
+            <a:r>
+              <a:rPr lang="en-US" altLang="zh-CN" sz="1600" dirty="0" smtClean="0">
+                <a:solidFill>
+                  <a:srgbClr val="FF0000"/>
+                </a:solidFill>
+              </a:rPr>
+              <a:t>-10-28</a:t>
+            </a:r>
+            <a:endParaRPr lang="en-US" sz="1600" dirty="0" smtClean="0">
+              <a:solidFill>
+                <a:srgbClr val="FF0000"/>
+              </a:solidFill>
+            </a:endParaRPr>
+          </a:p>
+          <a:p>
+            <a:r>
+              <a:rPr lang="en-US" sz="1600" dirty="0" smtClean="0">
+                <a:solidFill>
+                  <a:srgbClr val="FF0000"/>
+                </a:solidFill>
+              </a:rPr>
+              <a:t>Source</a:t>
+            </a:r>
+            <a:r>
+              <a:rPr lang="en-US" sz="1600" dirty="0" smtClean="0">
+                <a:solidFill>
+                  <a:srgbClr val="FF0000"/>
+                </a:solidFill>
+              </a:rPr>
+              <a:t>: T</a:t>
+            </a:r>
+            <a:r>
+              <a:rPr lang="en-US" sz="1600" dirty="0" smtClean="0">
+                <a:solidFill>
+                  <a:srgbClr val="FF0000"/>
+                </a:solidFill>
+              </a:rPr>
+              <a:t>alk with Daniele</a:t>
+            </a:r>
+            <a:endParaRPr lang="en-US" sz="1600" dirty="0">
+              <a:solidFill>
+                <a:srgbClr val="FF0000"/>
+              </a:solidFill>
+            </a:endParaRPr>
+          </a:p>
+        </p:txBody>
+      </p:sp>
+      <p:sp>
+        <p:nvSpPr>
+          <p:cNvPr id="5" name="文本框 4"/>
+          <p:cNvSpPr txBox="1"/>
+          <p:nvPr/>
+        </p:nvSpPr>
+        <p:spPr>
+          <a:xfrm>
+            <a:off x="2646947" y="955220"/>
+            <a:ext cx="6713622" cy="707886"/>
+          </a:xfrm>
+          <a:prstGeom prst="rect">
+            <a:avLst/>
+          </a:prstGeom>
+          <a:noFill/>
+        </p:spPr>
+        <p:txBody>
+          <a:bodyPr wrap="square" rtlCol="0">
+            <a:spAutoFit/>
+          </a:bodyPr>
+          <a:lstStyle/>
+          <a:p>
+            <a:r>
+              <a:rPr lang="en-US" altLang="zh-CN" sz="2400" b="1" dirty="0" smtClean="0">
+                <a:latin typeface="Times New Roman" panose="02020603050405020304" pitchFamily="18" charset="0"/>
+                <a:ea typeface="+mj-ea"/>
+                <a:cs typeface="Times New Roman" panose="02020603050405020304" pitchFamily="18" charset="0"/>
+              </a:rPr>
+              <a:t>Si-Si-</a:t>
+            </a:r>
+            <a:r>
+              <a:rPr lang="en-US" altLang="zh-CN" sz="2400" b="1" dirty="0" err="1" smtClean="0">
+                <a:latin typeface="Times New Roman" panose="02020603050405020304" pitchFamily="18" charset="0"/>
+                <a:ea typeface="+mj-ea"/>
+                <a:cs typeface="Times New Roman" panose="02020603050405020304" pitchFamily="18" charset="0"/>
+              </a:rPr>
+              <a:t>CsI</a:t>
+            </a:r>
+            <a:r>
+              <a:rPr lang="en-US" altLang="zh-CN" sz="2400" b="1" dirty="0" smtClean="0">
+                <a:latin typeface="Times New Roman" panose="02020603050405020304" pitchFamily="18" charset="0"/>
+                <a:ea typeface="+mj-ea"/>
+                <a:cs typeface="Times New Roman" panose="02020603050405020304" pitchFamily="18" charset="0"/>
+              </a:rPr>
+              <a:t> detector data analysis procedures</a:t>
+            </a:r>
+            <a:r>
+              <a:rPr lang="zh-CN" altLang="en-US" sz="2400" b="1" dirty="0" smtClean="0">
+                <a:latin typeface="Times New Roman" panose="02020603050405020304" pitchFamily="18" charset="0"/>
+                <a:ea typeface="+mj-ea"/>
+                <a:cs typeface="Times New Roman" panose="02020603050405020304" pitchFamily="18" charset="0"/>
+              </a:rPr>
+              <a:t>：</a:t>
+            </a:r>
+            <a:endParaRPr lang="en-US" altLang="zh-CN" sz="2400" b="1" dirty="0" smtClean="0">
+              <a:latin typeface="Times New Roman" panose="02020603050405020304" pitchFamily="18" charset="0"/>
+              <a:ea typeface="+mj-ea"/>
+              <a:cs typeface="Times New Roman" panose="02020603050405020304" pitchFamily="18" charset="0"/>
+            </a:endParaRPr>
+          </a:p>
+          <a:p>
+            <a:endParaRPr lang="en-US" altLang="zh-CN" sz="1600" dirty="0">
+              <a:latin typeface="+mj-ea"/>
+              <a:ea typeface="+mj-ea"/>
+            </a:endParaRPr>
+          </a:p>
+        </p:txBody>
+      </p:sp>
+      <p:sp>
+        <p:nvSpPr>
+          <p:cNvPr id="6" name="矩形 5"/>
+          <p:cNvSpPr/>
+          <p:nvPr/>
+        </p:nvSpPr>
+        <p:spPr>
+          <a:xfrm>
+            <a:off x="382648" y="1664219"/>
+            <a:ext cx="9413796" cy="2308324"/>
+          </a:xfrm>
+          <a:prstGeom prst="rect">
+            <a:avLst/>
+          </a:prstGeom>
+        </p:spPr>
+        <p:txBody>
+          <a:bodyPr wrap="none">
+            <a:spAutoFit/>
+          </a:bodyPr>
+          <a:lstStyle/>
+          <a:p>
+            <a:r>
+              <a:rPr lang="en-US" altLang="zh-CN" dirty="0" smtClean="0">
+                <a:latin typeface="Times New Roman" panose="02020603050405020304" pitchFamily="18" charset="0"/>
+                <a:cs typeface="Times New Roman" panose="02020603050405020304" pitchFamily="18" charset="0"/>
+              </a:rPr>
+              <a:t>1. Energy calibrations of Si detector with alpha source</a:t>
+            </a:r>
+          </a:p>
+          <a:p>
+            <a:r>
+              <a:rPr lang="en-US" altLang="zh-CN" dirty="0">
+                <a:latin typeface="Times New Roman" panose="02020603050405020304" pitchFamily="18" charset="0"/>
+                <a:cs typeface="Times New Roman" panose="02020603050405020304" pitchFamily="18" charset="0"/>
+              </a:rPr>
+              <a:t>2</a:t>
+            </a:r>
+            <a:r>
+              <a:rPr lang="en-US" altLang="zh-CN" dirty="0" smtClean="0">
+                <a:latin typeface="Times New Roman" panose="02020603050405020304" pitchFamily="18" charset="0"/>
+                <a:cs typeface="Times New Roman" panose="02020603050405020304" pitchFamily="18" charset="0"/>
+              </a:rPr>
+              <a:t>. Charge sharing method to determine the position of the hits: if the hit happens between two strips</a:t>
+            </a:r>
+            <a:endParaRPr lang="en-US" altLang="zh-CN" dirty="0">
+              <a:latin typeface="Times New Roman" panose="02020603050405020304" pitchFamily="18" charset="0"/>
+              <a:cs typeface="Times New Roman" panose="02020603050405020304" pitchFamily="18" charset="0"/>
+            </a:endParaRPr>
+          </a:p>
+          <a:p>
+            <a:r>
+              <a:rPr lang="en-US" altLang="zh-CN" dirty="0" smtClean="0">
+                <a:latin typeface="Times New Roman" panose="02020603050405020304" pitchFamily="18" charset="0"/>
+                <a:cs typeface="Times New Roman" panose="02020603050405020304" pitchFamily="18" charset="0"/>
+              </a:rPr>
+              <a:t>3. </a:t>
+            </a:r>
+            <a:r>
+              <a:rPr lang="en-US" altLang="zh-CN" dirty="0">
+                <a:latin typeface="Times New Roman" panose="02020603050405020304" pitchFamily="18" charset="0"/>
+                <a:cs typeface="Times New Roman" panose="02020603050405020304" pitchFamily="18" charset="0"/>
+              </a:rPr>
+              <a:t>Calibrations of </a:t>
+            </a:r>
+            <a:r>
+              <a:rPr lang="en-US" altLang="zh-CN" dirty="0" err="1" smtClean="0">
+                <a:latin typeface="Times New Roman" panose="02020603050405020304" pitchFamily="18" charset="0"/>
+                <a:cs typeface="Times New Roman" panose="02020603050405020304" pitchFamily="18" charset="0"/>
+              </a:rPr>
+              <a:t>CsI</a:t>
+            </a:r>
+            <a:endParaRPr lang="en-US" altLang="zh-CN" dirty="0" smtClean="0">
+              <a:latin typeface="Times New Roman" panose="02020603050405020304" pitchFamily="18" charset="0"/>
+              <a:cs typeface="Times New Roman" panose="02020603050405020304" pitchFamily="18" charset="0"/>
+            </a:endParaRPr>
+          </a:p>
+          <a:p>
+            <a:r>
+              <a:rPr lang="en-US" altLang="zh-CN" dirty="0" smtClean="0">
+                <a:latin typeface="Times New Roman" panose="02020603050405020304" pitchFamily="18" charset="0"/>
+                <a:cs typeface="Times New Roman" panose="02020603050405020304" pitchFamily="18" charset="0"/>
+              </a:rPr>
+              <a:t>4. </a:t>
+            </a:r>
+            <a:r>
+              <a:rPr lang="en-US" altLang="zh-CN" dirty="0" err="1" smtClean="0">
+                <a:latin typeface="Times New Roman" panose="02020603050405020304" pitchFamily="18" charset="0"/>
+                <a:cs typeface="Times New Roman" panose="02020603050405020304" pitchFamily="18" charset="0"/>
+              </a:rPr>
+              <a:t>Pixelization</a:t>
+            </a:r>
+            <a:endParaRPr lang="en-US" altLang="zh-CN" dirty="0" smtClean="0">
+              <a:latin typeface="Times New Roman" panose="02020603050405020304" pitchFamily="18" charset="0"/>
+              <a:cs typeface="Times New Roman" panose="02020603050405020304" pitchFamily="18" charset="0"/>
+            </a:endParaRPr>
+          </a:p>
+          <a:p>
+            <a:r>
+              <a:rPr lang="en-US" altLang="zh-CN" dirty="0" smtClean="0">
+                <a:latin typeface="Times New Roman" panose="02020603050405020304" pitchFamily="18" charset="0"/>
+                <a:cs typeface="Times New Roman" panose="02020603050405020304" pitchFamily="18" charset="0"/>
+              </a:rPr>
+              <a:t>5. Multiplicity analysis</a:t>
+            </a:r>
+          </a:p>
+          <a:p>
+            <a:r>
+              <a:rPr lang="en-US" altLang="zh-CN" dirty="0" smtClean="0">
+                <a:latin typeface="Times New Roman" panose="02020603050405020304" pitchFamily="18" charset="0"/>
+                <a:cs typeface="Times New Roman" panose="02020603050405020304" pitchFamily="18" charset="0"/>
+              </a:rPr>
+              <a:t>6. Double hit or multi-hit</a:t>
+            </a:r>
+          </a:p>
+          <a:p>
+            <a:r>
+              <a:rPr lang="en-US" altLang="zh-CN" dirty="0" smtClean="0">
+                <a:latin typeface="Times New Roman" panose="02020603050405020304" pitchFamily="18" charset="0"/>
+                <a:cs typeface="Times New Roman" panose="02020603050405020304" pitchFamily="18" charset="0"/>
+              </a:rPr>
+              <a:t>7. Particle Identification</a:t>
+            </a:r>
+            <a:endParaRPr lang="en-US" altLang="zh-CN" dirty="0">
+              <a:latin typeface="Times New Roman" panose="02020603050405020304" pitchFamily="18" charset="0"/>
+              <a:cs typeface="Times New Roman" panose="02020603050405020304" pitchFamily="18" charset="0"/>
+            </a:endParaRPr>
+          </a:p>
+          <a:p>
+            <a:endParaRPr lang="en-US" altLang="zh-CN" dirty="0">
+              <a:latin typeface="Times New Roman" panose="02020603050405020304" pitchFamily="18" charset="0"/>
+              <a:cs typeface="Times New Roman" panose="02020603050405020304" pitchFamily="18" charset="0"/>
             </a:endParaRPr>
           </a:p>
         </p:txBody>
@@ -3366,7 +3850,403 @@
 </p:sld>
 </file>
 
-<file path=ppt/slides/slide3.xml><?xml version="1.0" encoding="utf-8"?>
+<file path=ppt/slides/slide4.xml><?xml version="1.0" encoding="utf-8"?>
+<p:sld xmlns:a="http://schemas.openxmlformats.org/drawingml/2006/main" xmlns:r="http://schemas.openxmlformats.org/officeDocument/2006/relationships" xmlns:p="http://schemas.openxmlformats.org/presentationml/2006/main">
+  <p:cSld>
+    <p:spTree>
+      <p:nvGrpSpPr>
+        <p:cNvPr id="1" name=""/>
+        <p:cNvGrpSpPr/>
+        <p:nvPr/>
+      </p:nvGrpSpPr>
+      <p:grpSpPr>
+        <a:xfrm>
+          <a:off x="0" y="0"/>
+          <a:ext cx="0" cy="0"/>
+          <a:chOff x="0" y="0"/>
+          <a:chExt cx="0" cy="0"/>
+        </a:xfrm>
+      </p:grpSpPr>
+      <p:sp>
+        <p:nvSpPr>
+          <p:cNvPr id="2" name="TextBox 1"/>
+          <p:cNvSpPr txBox="1"/>
+          <p:nvPr/>
+        </p:nvSpPr>
+        <p:spPr>
+          <a:xfrm>
+            <a:off x="0" y="0"/>
+            <a:ext cx="7010400" cy="584775"/>
+          </a:xfrm>
+          <a:prstGeom prst="rect">
+            <a:avLst/>
+          </a:prstGeom>
+          <a:noFill/>
+        </p:spPr>
+        <p:txBody>
+          <a:bodyPr wrap="square" rtlCol="0">
+            <a:spAutoFit/>
+          </a:bodyPr>
+          <a:lstStyle/>
+          <a:p>
+            <a:r>
+              <a:rPr lang="en-US" sz="1600" dirty="0" smtClean="0">
+                <a:solidFill>
+                  <a:srgbClr val="FF0000"/>
+                </a:solidFill>
+              </a:rPr>
+              <a:t>Date</a:t>
+            </a:r>
+            <a:r>
+              <a:rPr lang="en-US" sz="1600" dirty="0" smtClean="0">
+                <a:solidFill>
+                  <a:srgbClr val="FF0000"/>
+                </a:solidFill>
+              </a:rPr>
+              <a:t>:</a:t>
+            </a:r>
+            <a:endParaRPr lang="en-US" sz="1600" dirty="0" smtClean="0">
+              <a:solidFill>
+                <a:srgbClr val="FF0000"/>
+              </a:solidFill>
+            </a:endParaRPr>
+          </a:p>
+          <a:p>
+            <a:r>
+              <a:rPr lang="en-US" sz="1600" dirty="0" smtClean="0">
+                <a:solidFill>
+                  <a:srgbClr val="FF0000"/>
+                </a:solidFill>
+              </a:rPr>
+              <a:t>Source</a:t>
+            </a:r>
+            <a:r>
+              <a:rPr lang="en-US" sz="1600" dirty="0" smtClean="0">
+                <a:solidFill>
+                  <a:srgbClr val="FF0000"/>
+                </a:solidFill>
+              </a:rPr>
+              <a:t>:</a:t>
+            </a:r>
+            <a:endParaRPr lang="en-US" sz="1600" dirty="0">
+              <a:solidFill>
+                <a:srgbClr val="FF0000"/>
+              </a:solidFill>
+            </a:endParaRPr>
+          </a:p>
+        </p:txBody>
+      </p:sp>
+    </p:spTree>
+    <p:extLst>
+      <p:ext uri="{BB962C8B-B14F-4D97-AF65-F5344CB8AC3E}">
+        <p14:creationId xmlns:p14="http://schemas.microsoft.com/office/powerpoint/2010/main" val="694994779"/>
+      </p:ext>
+    </p:extLst>
+  </p:cSld>
+  <p:clrMapOvr>
+    <a:masterClrMapping/>
+  </p:clrMapOvr>
+</p:sld>
+</file>
+
+<file path=ppt/slides/slide5.xml><?xml version="1.0" encoding="utf-8"?>
+<p:sld xmlns:a="http://schemas.openxmlformats.org/drawingml/2006/main" xmlns:r="http://schemas.openxmlformats.org/officeDocument/2006/relationships" xmlns:p="http://schemas.openxmlformats.org/presentationml/2006/main">
+  <p:cSld>
+    <p:spTree>
+      <p:nvGrpSpPr>
+        <p:cNvPr id="1" name=""/>
+        <p:cNvGrpSpPr/>
+        <p:nvPr/>
+      </p:nvGrpSpPr>
+      <p:grpSpPr>
+        <a:xfrm>
+          <a:off x="0" y="0"/>
+          <a:ext cx="0" cy="0"/>
+          <a:chOff x="0" y="0"/>
+          <a:chExt cx="0" cy="0"/>
+        </a:xfrm>
+      </p:grpSpPr>
+      <p:sp>
+        <p:nvSpPr>
+          <p:cNvPr id="2" name="TextBox 1"/>
+          <p:cNvSpPr txBox="1"/>
+          <p:nvPr/>
+        </p:nvSpPr>
+        <p:spPr>
+          <a:xfrm>
+            <a:off x="0" y="0"/>
+            <a:ext cx="7010400" cy="584775"/>
+          </a:xfrm>
+          <a:prstGeom prst="rect">
+            <a:avLst/>
+          </a:prstGeom>
+          <a:noFill/>
+        </p:spPr>
+        <p:txBody>
+          <a:bodyPr wrap="square" rtlCol="0">
+            <a:spAutoFit/>
+          </a:bodyPr>
+          <a:lstStyle/>
+          <a:p>
+            <a:r>
+              <a:rPr lang="en-US" sz="1600" dirty="0" smtClean="0">
+                <a:solidFill>
+                  <a:srgbClr val="FF0000"/>
+                </a:solidFill>
+              </a:rPr>
+              <a:t>Date</a:t>
+            </a:r>
+            <a:r>
+              <a:rPr lang="en-US" sz="1600" dirty="0" smtClean="0">
+                <a:solidFill>
+                  <a:srgbClr val="FF0000"/>
+                </a:solidFill>
+              </a:rPr>
+              <a:t>:</a:t>
+            </a:r>
+            <a:endParaRPr lang="en-US" sz="1600" dirty="0" smtClean="0">
+              <a:solidFill>
+                <a:srgbClr val="FF0000"/>
+              </a:solidFill>
+            </a:endParaRPr>
+          </a:p>
+          <a:p>
+            <a:r>
+              <a:rPr lang="en-US" sz="1600" dirty="0" smtClean="0">
+                <a:solidFill>
+                  <a:srgbClr val="FF0000"/>
+                </a:solidFill>
+              </a:rPr>
+              <a:t>Source</a:t>
+            </a:r>
+            <a:r>
+              <a:rPr lang="en-US" sz="1600" dirty="0" smtClean="0">
+                <a:solidFill>
+                  <a:srgbClr val="FF0000"/>
+                </a:solidFill>
+              </a:rPr>
+              <a:t>:</a:t>
+            </a:r>
+            <a:endParaRPr lang="en-US" sz="1600" dirty="0">
+              <a:solidFill>
+                <a:srgbClr val="FF0000"/>
+              </a:solidFill>
+            </a:endParaRPr>
+          </a:p>
+        </p:txBody>
+      </p:sp>
+    </p:spTree>
+    <p:extLst>
+      <p:ext uri="{BB962C8B-B14F-4D97-AF65-F5344CB8AC3E}">
+        <p14:creationId xmlns:p14="http://schemas.microsoft.com/office/powerpoint/2010/main" val="1318587503"/>
+      </p:ext>
+    </p:extLst>
+  </p:cSld>
+  <p:clrMapOvr>
+    <a:masterClrMapping/>
+  </p:clrMapOvr>
+</p:sld>
+</file>
+
+<file path=ppt/slides/slide6.xml><?xml version="1.0" encoding="utf-8"?>
+<p:sld xmlns:a="http://schemas.openxmlformats.org/drawingml/2006/main" xmlns:r="http://schemas.openxmlformats.org/officeDocument/2006/relationships" xmlns:p="http://schemas.openxmlformats.org/presentationml/2006/main">
+  <p:cSld>
+    <p:spTree>
+      <p:nvGrpSpPr>
+        <p:cNvPr id="1" name=""/>
+        <p:cNvGrpSpPr/>
+        <p:nvPr/>
+      </p:nvGrpSpPr>
+      <p:grpSpPr>
+        <a:xfrm>
+          <a:off x="0" y="0"/>
+          <a:ext cx="0" cy="0"/>
+          <a:chOff x="0" y="0"/>
+          <a:chExt cx="0" cy="0"/>
+        </a:xfrm>
+      </p:grpSpPr>
+      <p:sp>
+        <p:nvSpPr>
+          <p:cNvPr id="2" name="TextBox 1"/>
+          <p:cNvSpPr txBox="1"/>
+          <p:nvPr/>
+        </p:nvSpPr>
+        <p:spPr>
+          <a:xfrm>
+            <a:off x="0" y="0"/>
+            <a:ext cx="7010400" cy="584775"/>
+          </a:xfrm>
+          <a:prstGeom prst="rect">
+            <a:avLst/>
+          </a:prstGeom>
+          <a:noFill/>
+        </p:spPr>
+        <p:txBody>
+          <a:bodyPr wrap="square" rtlCol="0">
+            <a:spAutoFit/>
+          </a:bodyPr>
+          <a:lstStyle/>
+          <a:p>
+            <a:r>
+              <a:rPr lang="en-US" sz="1600" dirty="0" smtClean="0">
+                <a:solidFill>
+                  <a:srgbClr val="FF0000"/>
+                </a:solidFill>
+              </a:rPr>
+              <a:t>Date</a:t>
+            </a:r>
+            <a:r>
+              <a:rPr lang="en-US" sz="1600" dirty="0" smtClean="0">
+                <a:solidFill>
+                  <a:srgbClr val="FF0000"/>
+                </a:solidFill>
+              </a:rPr>
+              <a:t>:</a:t>
+            </a:r>
+            <a:endParaRPr lang="en-US" sz="1600" dirty="0" smtClean="0">
+              <a:solidFill>
+                <a:srgbClr val="FF0000"/>
+              </a:solidFill>
+            </a:endParaRPr>
+          </a:p>
+          <a:p>
+            <a:r>
+              <a:rPr lang="en-US" sz="1600" dirty="0" smtClean="0">
+                <a:solidFill>
+                  <a:srgbClr val="FF0000"/>
+                </a:solidFill>
+              </a:rPr>
+              <a:t>Source</a:t>
+            </a:r>
+            <a:r>
+              <a:rPr lang="en-US" sz="1600" dirty="0" smtClean="0">
+                <a:solidFill>
+                  <a:srgbClr val="FF0000"/>
+                </a:solidFill>
+              </a:rPr>
+              <a:t>:</a:t>
+            </a:r>
+            <a:endParaRPr lang="en-US" sz="1600" dirty="0">
+              <a:solidFill>
+                <a:srgbClr val="FF0000"/>
+              </a:solidFill>
+            </a:endParaRPr>
+          </a:p>
+        </p:txBody>
+      </p:sp>
+    </p:spTree>
+    <p:extLst>
+      <p:ext uri="{BB962C8B-B14F-4D97-AF65-F5344CB8AC3E}">
+        <p14:creationId xmlns:p14="http://schemas.microsoft.com/office/powerpoint/2010/main" val="2814243742"/>
+      </p:ext>
+    </p:extLst>
+  </p:cSld>
+  <p:clrMapOvr>
+    <a:masterClrMapping/>
+  </p:clrMapOvr>
+</p:sld>
+</file>
+
+<file path=ppt/slides/slide7.xml><?xml version="1.0" encoding="utf-8"?>
+<p:sld xmlns:a="http://schemas.openxmlformats.org/drawingml/2006/main" xmlns:r="http://schemas.openxmlformats.org/officeDocument/2006/relationships" xmlns:p="http://schemas.openxmlformats.org/presentationml/2006/main">
+  <p:cSld>
+    <p:spTree>
+      <p:nvGrpSpPr>
+        <p:cNvPr id="1" name=""/>
+        <p:cNvGrpSpPr/>
+        <p:nvPr/>
+      </p:nvGrpSpPr>
+      <p:grpSpPr>
+        <a:xfrm>
+          <a:off x="0" y="0"/>
+          <a:ext cx="0" cy="0"/>
+          <a:chOff x="0" y="0"/>
+          <a:chExt cx="0" cy="0"/>
+        </a:xfrm>
+      </p:grpSpPr>
+      <p:sp>
+        <p:nvSpPr>
+          <p:cNvPr id="2" name="TextBox 1"/>
+          <p:cNvSpPr txBox="1"/>
+          <p:nvPr/>
+        </p:nvSpPr>
+        <p:spPr>
+          <a:xfrm>
+            <a:off x="0" y="0"/>
+            <a:ext cx="7010400" cy="584775"/>
+          </a:xfrm>
+          <a:prstGeom prst="rect">
+            <a:avLst/>
+          </a:prstGeom>
+          <a:noFill/>
+        </p:spPr>
+        <p:txBody>
+          <a:bodyPr wrap="square" rtlCol="0">
+            <a:spAutoFit/>
+          </a:bodyPr>
+          <a:lstStyle/>
+          <a:p>
+            <a:r>
+              <a:rPr lang="en-US" sz="1600" dirty="0" smtClean="0">
+                <a:solidFill>
+                  <a:srgbClr val="FF0000"/>
+                </a:solidFill>
+              </a:rPr>
+              <a:t>Date</a:t>
+            </a:r>
+            <a:r>
+              <a:rPr lang="en-US" sz="1600" dirty="0" smtClean="0">
+                <a:solidFill>
+                  <a:srgbClr val="FF0000"/>
+                </a:solidFill>
+              </a:rPr>
+              <a:t>:</a:t>
+            </a:r>
+            <a:endParaRPr lang="en-US" sz="1600" dirty="0" smtClean="0">
+              <a:solidFill>
+                <a:srgbClr val="FF0000"/>
+              </a:solidFill>
+            </a:endParaRPr>
+          </a:p>
+          <a:p>
+            <a:r>
+              <a:rPr lang="en-US" sz="1600" dirty="0" smtClean="0">
+                <a:solidFill>
+                  <a:srgbClr val="FF0000"/>
+                </a:solidFill>
+              </a:rPr>
+              <a:t>Source</a:t>
+            </a:r>
+            <a:r>
+              <a:rPr lang="en-US" sz="1600" dirty="0" smtClean="0">
+                <a:solidFill>
+                  <a:srgbClr val="FF0000"/>
+                </a:solidFill>
+              </a:rPr>
+              <a:t>:</a:t>
+            </a:r>
+            <a:endParaRPr lang="en-US" sz="1600" dirty="0">
+              <a:solidFill>
+                <a:srgbClr val="FF0000"/>
+              </a:solidFill>
+            </a:endParaRPr>
+          </a:p>
+        </p:txBody>
+      </p:sp>
+    </p:spTree>
+    <p:extLst>
+      <p:ext uri="{BB962C8B-B14F-4D97-AF65-F5344CB8AC3E}">
+        <p14:creationId xmlns:p14="http://schemas.microsoft.com/office/powerpoint/2010/main" val="3093701310"/>
+      </p:ext>
+    </p:extLst>
+  </p:cSld>
+  <p:clrMapOvr>
+    <a:masterClrMapping/>
+  </p:clrMapOvr>
+</p:sld>
+</file>
+
+<file path=ppt/slides/slide8.xml><?xml version="1.0" encoding="utf-8"?>
 <p:sld xmlns:a="http://schemas.openxmlformats.org/drawingml/2006/main" xmlns:r="http://schemas.openxmlformats.org/officeDocument/2006/relationships" xmlns:p="http://schemas.openxmlformats.org/presentationml/2006/main">
   <p:cSld>
     <p:spTree>
@@ -3396,7 +4276,7 @@
 </p:sld>
 </file>
 
-<file path=ppt/slides/slide4.xml><?xml version="1.0" encoding="utf-8"?>
+<file path=ppt/slides/slide9.xml><?xml version="1.0" encoding="utf-8"?>
 <p:sld xmlns:a="http://schemas.openxmlformats.org/drawingml/2006/main" xmlns:r="http://schemas.openxmlformats.org/officeDocument/2006/relationships" xmlns:p="http://schemas.openxmlformats.org/presentationml/2006/main">
   <p:cSld>
     <p:spTree>
@@ -3417,126 +4297,6 @@
     <p:extLst>
       <p:ext uri="{BB962C8B-B14F-4D97-AF65-F5344CB8AC3E}">
         <p14:creationId xmlns:p14="http://schemas.microsoft.com/office/powerpoint/2010/main" val="1833532843"/>
-      </p:ext>
-    </p:extLst>
-  </p:cSld>
-  <p:clrMapOvr>
-    <a:masterClrMapping/>
-  </p:clrMapOvr>
-</p:sld>
-</file>
-
-<file path=ppt/slides/slide5.xml><?xml version="1.0" encoding="utf-8"?>
-<p:sld xmlns:a="http://schemas.openxmlformats.org/drawingml/2006/main" xmlns:r="http://schemas.openxmlformats.org/officeDocument/2006/relationships" xmlns:p="http://schemas.openxmlformats.org/presentationml/2006/main">
-  <p:cSld>
-    <p:spTree>
-      <p:nvGrpSpPr>
-        <p:cNvPr id="1" name=""/>
-        <p:cNvGrpSpPr/>
-        <p:nvPr/>
-      </p:nvGrpSpPr>
-      <p:grpSpPr>
-        <a:xfrm>
-          <a:off x="0" y="0"/>
-          <a:ext cx="0" cy="0"/>
-          <a:chOff x="0" y="0"/>
-          <a:chExt cx="0" cy="0"/>
-        </a:xfrm>
-      </p:grpSpPr>
-    </p:spTree>
-    <p:extLst>
-      <p:ext uri="{BB962C8B-B14F-4D97-AF65-F5344CB8AC3E}">
-        <p14:creationId xmlns:p14="http://schemas.microsoft.com/office/powerpoint/2010/main" val="3578612920"/>
-      </p:ext>
-    </p:extLst>
-  </p:cSld>
-  <p:clrMapOvr>
-    <a:masterClrMapping/>
-  </p:clrMapOvr>
-</p:sld>
-</file>
-
-<file path=ppt/slides/slide6.xml><?xml version="1.0" encoding="utf-8"?>
-<p:sld xmlns:a="http://schemas.openxmlformats.org/drawingml/2006/main" xmlns:r="http://schemas.openxmlformats.org/officeDocument/2006/relationships" xmlns:p="http://schemas.openxmlformats.org/presentationml/2006/main">
-  <p:cSld>
-    <p:spTree>
-      <p:nvGrpSpPr>
-        <p:cNvPr id="1" name=""/>
-        <p:cNvGrpSpPr/>
-        <p:nvPr/>
-      </p:nvGrpSpPr>
-      <p:grpSpPr>
-        <a:xfrm>
-          <a:off x="0" y="0"/>
-          <a:ext cx="0" cy="0"/>
-          <a:chOff x="0" y="0"/>
-          <a:chExt cx="0" cy="0"/>
-        </a:xfrm>
-      </p:grpSpPr>
-    </p:spTree>
-    <p:extLst>
-      <p:ext uri="{BB962C8B-B14F-4D97-AF65-F5344CB8AC3E}">
-        <p14:creationId xmlns:p14="http://schemas.microsoft.com/office/powerpoint/2010/main" val="1885448950"/>
-      </p:ext>
-    </p:extLst>
-  </p:cSld>
-  <p:clrMapOvr>
-    <a:masterClrMapping/>
-  </p:clrMapOvr>
-</p:sld>
-</file>
-
-<file path=ppt/slides/slide7.xml><?xml version="1.0" encoding="utf-8"?>
-<p:sld xmlns:a="http://schemas.openxmlformats.org/drawingml/2006/main" xmlns:r="http://schemas.openxmlformats.org/officeDocument/2006/relationships" xmlns:p="http://schemas.openxmlformats.org/presentationml/2006/main">
-  <p:cSld>
-    <p:spTree>
-      <p:nvGrpSpPr>
-        <p:cNvPr id="1" name=""/>
-        <p:cNvGrpSpPr/>
-        <p:nvPr/>
-      </p:nvGrpSpPr>
-      <p:grpSpPr>
-        <a:xfrm>
-          <a:off x="0" y="0"/>
-          <a:ext cx="0" cy="0"/>
-          <a:chOff x="0" y="0"/>
-          <a:chExt cx="0" cy="0"/>
-        </a:xfrm>
-      </p:grpSpPr>
-    </p:spTree>
-    <p:extLst>
-      <p:ext uri="{BB962C8B-B14F-4D97-AF65-F5344CB8AC3E}">
-        <p14:creationId xmlns:p14="http://schemas.microsoft.com/office/powerpoint/2010/main" val="2761243511"/>
-      </p:ext>
-    </p:extLst>
-  </p:cSld>
-  <p:clrMapOvr>
-    <a:masterClrMapping/>
-  </p:clrMapOvr>
-</p:sld>
-</file>
-
-<file path=ppt/slides/slide8.xml><?xml version="1.0" encoding="utf-8"?>
-<p:sld xmlns:a="http://schemas.openxmlformats.org/drawingml/2006/main" xmlns:r="http://schemas.openxmlformats.org/officeDocument/2006/relationships" xmlns:p="http://schemas.openxmlformats.org/presentationml/2006/main">
-  <p:cSld>
-    <p:spTree>
-      <p:nvGrpSpPr>
-        <p:cNvPr id="1" name=""/>
-        <p:cNvGrpSpPr/>
-        <p:nvPr/>
-      </p:nvGrpSpPr>
-      <p:grpSpPr>
-        <a:xfrm>
-          <a:off x="0" y="0"/>
-          <a:ext cx="0" cy="0"/>
-          <a:chOff x="0" y="0"/>
-          <a:chExt cx="0" cy="0"/>
-        </a:xfrm>
-      </p:grpSpPr>
-    </p:spTree>
-    <p:extLst>
-      <p:ext uri="{BB962C8B-B14F-4D97-AF65-F5344CB8AC3E}">
-        <p14:creationId xmlns:p14="http://schemas.microsoft.com/office/powerpoint/2010/main" val="1392733591"/>
       </p:ext>
     </p:extLst>
   </p:cSld>

</xml_diff>